<commit_message>
actualizacion slides best model
</commit_message>
<xml_diff>
--- a/reports/slides/best_equipo_08.pptx
+++ b/reports/slides/best_equipo_08.pptx
@@ -9,7 +9,7 @@
   </p:notesMasterIdLst>
   <p:sldIdLst>
     <p:sldId id="264" r:id="rId2"/>
-    <p:sldId id="266" r:id="rId3"/>
+    <p:sldId id="271" r:id="rId3"/>
     <p:sldId id="268" r:id="rId4"/>
     <p:sldId id="265" r:id="rId5"/>
     <p:sldId id="267" r:id="rId6"/>
@@ -3594,12 +3594,117 @@
           <a:chExt cx="0" cy="0"/>
         </a:xfrm>
       </p:grpSpPr>
+      <p:sp>
+        <p:nvSpPr>
+          <p:cNvPr id="9" name="Título 1">
+            <a:extLst>
+              <a:ext uri="{FF2B5EF4-FFF2-40B4-BE49-F238E27FC236}">
+                <a16:creationId xmlns:a16="http://schemas.microsoft.com/office/drawing/2014/main" id="{23C73C8E-6C08-A6DF-5824-FAEB24E8DFEC}"/>
+              </a:ext>
+            </a:extLst>
+          </p:cNvPr>
+          <p:cNvSpPr>
+            <a:spLocks noGrp="1"/>
+          </p:cNvSpPr>
+          <p:nvPr>
+            <p:ph type="title"/>
+          </p:nvPr>
+        </p:nvSpPr>
+        <p:spPr>
+          <a:xfrm>
+            <a:off x="611560" y="1916832"/>
+            <a:ext cx="8229600" cy="500063"/>
+          </a:xfrm>
+        </p:spPr>
+        <p:txBody>
+          <a:bodyPr/>
+          <a:lstStyle/>
+          <a:p>
+            <a:pPr algn="ctr"/>
+            <a:r>
+              <a:rPr lang="es-CO" altLang="es-CO" dirty="0" err="1"/>
+              <a:t>Best</a:t>
+            </a:r>
+            <a:r>
+              <a:rPr lang="es-CO" altLang="es-CO" dirty="0"/>
+              <a:t> </a:t>
+            </a:r>
+            <a:r>
+              <a:rPr lang="es-CO" altLang="es-CO" dirty="0" err="1"/>
+              <a:t>model</a:t>
+            </a:r>
+            <a:r>
+              <a:rPr lang="es-CO" altLang="es-CO" dirty="0"/>
+              <a:t> </a:t>
+            </a:r>
+            <a:r>
+              <a:rPr lang="es-CO" altLang="es-CO" dirty="0" err="1"/>
+              <a:t>overview</a:t>
+            </a:r>
+            <a:r>
+              <a:rPr lang="es-CO" altLang="es-CO" dirty="0"/>
+              <a:t> – </a:t>
+            </a:r>
+            <a:r>
+              <a:rPr lang="es-CO" altLang="es-CO" dirty="0" err="1"/>
+              <a:t>Random</a:t>
+            </a:r>
+            <a:r>
+              <a:rPr lang="es-CO" altLang="es-CO" dirty="0"/>
+              <a:t> Forest CV espacial</a:t>
+            </a:r>
+          </a:p>
+        </p:txBody>
+      </p:sp>
+      <p:sp>
+        <p:nvSpPr>
+          <p:cNvPr id="11" name="CuadroTexto 10">
+            <a:extLst>
+              <a:ext uri="{FF2B5EF4-FFF2-40B4-BE49-F238E27FC236}">
+                <a16:creationId xmlns:a16="http://schemas.microsoft.com/office/drawing/2014/main" id="{45F5ABE4-E37F-C457-F840-318F45C07DB3}"/>
+              </a:ext>
+            </a:extLst>
+          </p:cNvPr>
+          <p:cNvSpPr txBox="1"/>
+          <p:nvPr/>
+        </p:nvSpPr>
+        <p:spPr>
+          <a:xfrm>
+            <a:off x="1043608" y="5013176"/>
+            <a:ext cx="7165291" cy="1200329"/>
+          </a:xfrm>
+          <a:prstGeom prst="rect">
+            <a:avLst/>
+          </a:prstGeom>
+          <a:noFill/>
+        </p:spPr>
+        <p:txBody>
+          <a:bodyPr wrap="square">
+            <a:spAutoFit/>
+          </a:bodyPr>
+          <a:lstStyle/>
+          <a:p>
+            <a:r>
+              <a:rPr lang="es-ES" dirty="0"/>
+              <a:t>Usando el CV espacial se generalizaron mejor las zonas no vistas. El ensamble por </a:t>
+            </a:r>
+            <a:r>
+              <a:rPr lang="es-ES" dirty="0" err="1"/>
+              <a:t>folds</a:t>
+            </a:r>
+            <a:r>
+              <a:rPr lang="es-ES" dirty="0"/>
+              <a:t> reduce varianza y el bosque capta no linealidades e interacciones entre tamaño, ubicación, distancias y amenidades, entregando predicciones estables sin sobreajuste.</a:t>
+            </a:r>
+          </a:p>
+        </p:txBody>
+      </p:sp>
       <p:pic>
         <p:nvPicPr>
-          <p:cNvPr id="5" name="Imagen 4">
+          <p:cNvPr id="3" name="Imagen 2">
             <a:extLst>
               <a:ext uri="{FF2B5EF4-FFF2-40B4-BE49-F238E27FC236}">
-                <a16:creationId xmlns:a16="http://schemas.microsoft.com/office/drawing/2014/main" id="{E6764B55-0F86-90CD-D38E-6E2CDCF5391D}"/>
+                <a16:creationId xmlns:a16="http://schemas.microsoft.com/office/drawing/2014/main" id="{4909DD69-D753-B1D1-93EE-4D3287566080}"/>
               </a:ext>
             </a:extLst>
           </p:cNvPr>
@@ -3622,114 +3727,18 @@
         </p:blipFill>
         <p:spPr>
           <a:xfrm>
-            <a:off x="827584" y="3645024"/>
-            <a:ext cx="8176800" cy="2448272"/>
+            <a:off x="755576" y="2370580"/>
+            <a:ext cx="8424780" cy="2282556"/>
           </a:xfrm>
           <a:prstGeom prst="rect">
             <a:avLst/>
           </a:prstGeom>
         </p:spPr>
       </p:pic>
-      <p:sp>
-        <p:nvSpPr>
-          <p:cNvPr id="6" name="CuadroTexto 5">
-            <a:extLst>
-              <a:ext uri="{FF2B5EF4-FFF2-40B4-BE49-F238E27FC236}">
-                <a16:creationId xmlns:a16="http://schemas.microsoft.com/office/drawing/2014/main" id="{C4399D47-E4BB-B304-EB39-9AD9BFE3F47E}"/>
-              </a:ext>
-            </a:extLst>
-          </p:cNvPr>
-          <p:cNvSpPr txBox="1"/>
-          <p:nvPr/>
-        </p:nvSpPr>
-        <p:spPr>
-          <a:xfrm>
-            <a:off x="755576" y="2204864"/>
-            <a:ext cx="8176800" cy="1477328"/>
-          </a:xfrm>
-          <a:prstGeom prst="rect">
-            <a:avLst/>
-          </a:prstGeom>
-          <a:noFill/>
-        </p:spPr>
-        <p:txBody>
-          <a:bodyPr wrap="square" rtlCol="0">
-            <a:spAutoFit/>
-          </a:bodyPr>
-          <a:lstStyle/>
-          <a:p>
-            <a:pPr marL="285750" indent="-285750">
-              <a:buFont typeface="Arial" panose="020B0604020202020204" pitchFamily="34" charset="0"/>
-              <a:buChar char="•"/>
-            </a:pPr>
-            <a:r>
-              <a:rPr lang="es-MX" dirty="0"/>
-              <a:t>El objetivo fue </a:t>
-            </a:r>
-            <a:r>
-              <a:rPr lang="es-MX" b="1" dirty="0"/>
-              <a:t>reducir la varianza</a:t>
-            </a:r>
-            <a:r>
-              <a:rPr lang="es-MX" dirty="0"/>
-              <a:t> y </a:t>
-            </a:r>
-            <a:r>
-              <a:rPr lang="es-MX" b="1" dirty="0"/>
-              <a:t>mejorar la estabilidad</a:t>
-            </a:r>
-            <a:r>
-              <a:rPr lang="es-MX" dirty="0"/>
-              <a:t> de las predicciones frente al desbalance de clases (</a:t>
-            </a:r>
-            <a:r>
-              <a:rPr lang="es-MX" i="1" dirty="0"/>
-              <a:t>Pobre: 20%, </a:t>
-            </a:r>
-            <a:r>
-              <a:rPr lang="es-MX" i="1" dirty="0" err="1"/>
-              <a:t>NoPobre</a:t>
-            </a:r>
-            <a:r>
-              <a:rPr lang="es-MX" i="1" dirty="0"/>
-              <a:t>: 80%</a:t>
-            </a:r>
-            <a:r>
-              <a:rPr lang="es-MX" dirty="0"/>
-              <a:t>).</a:t>
-            </a:r>
-          </a:p>
-          <a:p>
-            <a:pPr marL="285750" indent="-285750">
-              <a:buFont typeface="Arial" panose="020B0604020202020204" pitchFamily="34" charset="0"/>
-              <a:buChar char="•"/>
-            </a:pPr>
-            <a:r>
-              <a:rPr lang="es-CO" dirty="0"/>
-              <a:t>Se entrenó con </a:t>
-            </a:r>
-            <a:r>
-              <a:rPr lang="es-CO" b="1" dirty="0"/>
-              <a:t>validación cruzada estratificada</a:t>
-            </a:r>
-            <a:r>
-              <a:rPr lang="es-CO" dirty="0"/>
-              <a:t> (5-fold para XGB, 3-fold para CART) y ponderación de clases</a:t>
-            </a:r>
-          </a:p>
-          <a:p>
-            <a:pPr marL="285750" indent="-285750">
-              <a:buFont typeface="Arial" panose="020B0604020202020204" pitchFamily="34" charset="0"/>
-              <a:buChar char="•"/>
-            </a:pPr>
-            <a:endParaRPr lang="es-CO" dirty="0"/>
-          </a:p>
-        </p:txBody>
-      </p:sp>
     </p:spTree>
     <p:extLst>
       <p:ext uri="{BB962C8B-B14F-4D97-AF65-F5344CB8AC3E}">
-        <p14:creationId xmlns:p14="http://schemas.microsoft.com/office/powerpoint/2010/main" val="2266962237"/>
+        <p14:creationId xmlns:p14="http://schemas.microsoft.com/office/powerpoint/2010/main" val="2214650793"/>
       </p:ext>
     </p:extLst>
   </p:cSld>

</xml_diff>